<commit_message>
old update (deliveries, etc.)
</commit_message>
<xml_diff>
--- a/content/downloads/code/google-maps-api/distance_matrix.pptx
+++ b/content/downloads/code/google-maps-api/distance_matrix.pptx
@@ -6,6 +6,7 @@
   </p:sldMasterIdLst>
   <p:sldIdLst>
     <p:sldId id="256" r:id="rId2"/>
+    <p:sldId id="257" r:id="rId3"/>
   </p:sldIdLst>
   <p:sldSz cx="12192000" cy="6858000"/>
   <p:notesSz cx="6858000" cy="9144000"/>
@@ -4276,6 +4277,1553 @@
 </p:sld>
 </file>
 
+<file path=ppt/slides/slide2.xml><?xml version="1.0" encoding="utf-8"?>
+<p:sld xmlns:a="http://schemas.openxmlformats.org/drawingml/2006/main" xmlns:r="http://schemas.openxmlformats.org/officeDocument/2006/relationships" xmlns:p="http://schemas.openxmlformats.org/presentationml/2006/main">
+  <p:cSld>
+    <p:spTree>
+      <p:nvGrpSpPr>
+        <p:cNvPr id="1" name=""/>
+        <p:cNvGrpSpPr/>
+        <p:nvPr/>
+      </p:nvGrpSpPr>
+      <p:grpSpPr>
+        <a:xfrm>
+          <a:off x="0" y="0"/>
+          <a:ext cx="0" cy="0"/>
+          <a:chOff x="0" y="0"/>
+          <a:chExt cx="0" cy="0"/>
+        </a:xfrm>
+      </p:grpSpPr>
+      <p:graphicFrame>
+        <p:nvGraphicFramePr>
+          <p:cNvPr id="3" name="Table 2">
+            <a:extLst>
+              <a:ext uri="{FF2B5EF4-FFF2-40B4-BE49-F238E27FC236}">
+                <a16:creationId xmlns:a16="http://schemas.microsoft.com/office/drawing/2014/main" id="{CA8C0316-60B6-164F-9209-9A7954A93E38}"/>
+              </a:ext>
+            </a:extLst>
+          </p:cNvPr>
+          <p:cNvGraphicFramePr>
+            <a:graphicFrameLocks noGrp="1"/>
+          </p:cNvGraphicFramePr>
+          <p:nvPr>
+            <p:extLst>
+              <p:ext uri="{D42A27DB-BD31-4B8C-83A1-F6EECF244321}">
+                <p14:modId xmlns:p14="http://schemas.microsoft.com/office/powerpoint/2010/main" val="3273567842"/>
+              </p:ext>
+            </p:extLst>
+          </p:nvPr>
+        </p:nvGraphicFramePr>
+        <p:xfrm>
+          <a:off x="2949240" y="2128865"/>
+          <a:ext cx="6121398" cy="2540000"/>
+        </p:xfrm>
+        <a:graphic>
+          <a:graphicData uri="http://schemas.openxmlformats.org/drawingml/2006/table">
+            <a:tbl>
+              <a:tblPr/>
+              <a:tblGrid>
+                <a:gridCol w="1292718">
+                  <a:extLst>
+                    <a:ext uri="{9D8B030D-6E8A-4147-A177-3AD203B41FA5}">
+                      <a16:colId xmlns:a16="http://schemas.microsoft.com/office/drawing/2014/main" val="3852474714"/>
+                    </a:ext>
+                  </a:extLst>
+                </a:gridCol>
+                <a:gridCol w="1207170">
+                  <a:extLst>
+                    <a:ext uri="{9D8B030D-6E8A-4147-A177-3AD203B41FA5}">
+                      <a16:colId xmlns:a16="http://schemas.microsoft.com/office/drawing/2014/main" val="1572641543"/>
+                    </a:ext>
+                  </a:extLst>
+                </a:gridCol>
+                <a:gridCol w="1207170">
+                  <a:extLst>
+                    <a:ext uri="{9D8B030D-6E8A-4147-A177-3AD203B41FA5}">
+                      <a16:colId xmlns:a16="http://schemas.microsoft.com/office/drawing/2014/main" val="2992600487"/>
+                    </a:ext>
+                  </a:extLst>
+                </a:gridCol>
+                <a:gridCol w="1207170">
+                  <a:extLst>
+                    <a:ext uri="{9D8B030D-6E8A-4147-A177-3AD203B41FA5}">
+                      <a16:colId xmlns:a16="http://schemas.microsoft.com/office/drawing/2014/main" val="3631123923"/>
+                    </a:ext>
+                  </a:extLst>
+                </a:gridCol>
+                <a:gridCol w="1207170">
+                  <a:extLst>
+                    <a:ext uri="{9D8B030D-6E8A-4147-A177-3AD203B41FA5}">
+                      <a16:colId xmlns:a16="http://schemas.microsoft.com/office/drawing/2014/main" val="1480108801"/>
+                    </a:ext>
+                  </a:extLst>
+                </a:gridCol>
+              </a:tblGrid>
+              <a:tr h="508000">
+                <a:tc>
+                  <a:txBody>
+                    <a:bodyPr/>
+                    <a:lstStyle/>
+                    <a:p>
+                      <a:pPr algn="ctr" fontAlgn="ctr"/>
+                      <a:r>
+                        <a:rPr lang="en-US" sz="1400" b="0" i="1" u="none" strike="noStrike">
+                          <a:solidFill>
+                            <a:srgbClr val="000000"/>
+                          </a:solidFill>
+                          <a:effectLst/>
+                          <a:latin typeface="Source Sans Pro Regular" panose="020B0503030403020204" pitchFamily="34" charset="0"/>
+                        </a:rPr>
+                        <a:t>Distance Matrix</a:t>
+                      </a:r>
+                    </a:p>
+                  </a:txBody>
+                  <a:tcPr marL="9525" marR="9525" marT="9525" marB="0" anchor="ctr">
+                    <a:lnL>
+                      <a:noFill/>
+                    </a:lnL>
+                    <a:lnR w="6350" cap="flat" cmpd="sng" algn="ctr">
+                      <a:solidFill>
+                        <a:srgbClr val="000000"/>
+                      </a:solidFill>
+                      <a:prstDash val="solid"/>
+                      <a:round/>
+                      <a:headEnd type="none" w="med" len="med"/>
+                      <a:tailEnd type="none" w="med" len="med"/>
+                    </a:lnR>
+                    <a:lnT>
+                      <a:noFill/>
+                    </a:lnT>
+                    <a:lnB w="6350" cap="flat" cmpd="sng" algn="ctr">
+                      <a:solidFill>
+                        <a:srgbClr val="000000"/>
+                      </a:solidFill>
+                      <a:prstDash val="solid"/>
+                      <a:round/>
+                      <a:headEnd type="none" w="med" len="med"/>
+                      <a:tailEnd type="none" w="med" len="med"/>
+                    </a:lnB>
+                  </a:tcPr>
+                </a:tc>
+                <a:tc>
+                  <a:txBody>
+                    <a:bodyPr/>
+                    <a:lstStyle/>
+                    <a:p>
+                      <a:pPr algn="ctr" fontAlgn="ctr"/>
+                      <a:r>
+                        <a:rPr lang="en-US" sz="1400" b="0" i="0" u="none" strike="noStrike">
+                          <a:solidFill>
+                            <a:srgbClr val="000000"/>
+                          </a:solidFill>
+                          <a:effectLst/>
+                          <a:latin typeface="Source Sans Pro Regular" panose="020B0503030403020204" pitchFamily="34" charset="0"/>
+                        </a:rPr>
+                        <a:t>Location 1</a:t>
+                      </a:r>
+                    </a:p>
+                  </a:txBody>
+                  <a:tcPr marL="9525" marR="9525" marT="9525" marB="0" anchor="ctr">
+                    <a:lnL w="6350" cap="flat" cmpd="sng" algn="ctr">
+                      <a:solidFill>
+                        <a:srgbClr val="000000"/>
+                      </a:solidFill>
+                      <a:prstDash val="solid"/>
+                      <a:round/>
+                      <a:headEnd type="none" w="med" len="med"/>
+                      <a:tailEnd type="none" w="med" len="med"/>
+                    </a:lnL>
+                    <a:lnR w="6350" cap="flat" cmpd="sng" algn="ctr">
+                      <a:solidFill>
+                        <a:srgbClr val="000000"/>
+                      </a:solidFill>
+                      <a:prstDash val="solid"/>
+                      <a:round/>
+                      <a:headEnd type="none" w="med" len="med"/>
+                      <a:tailEnd type="none" w="med" len="med"/>
+                    </a:lnR>
+                    <a:lnT w="6350" cap="flat" cmpd="sng" algn="ctr">
+                      <a:solidFill>
+                        <a:srgbClr val="000000"/>
+                      </a:solidFill>
+                      <a:prstDash val="solid"/>
+                      <a:round/>
+                      <a:headEnd type="none" w="med" len="med"/>
+                      <a:tailEnd type="none" w="med" len="med"/>
+                    </a:lnT>
+                    <a:lnB w="6350" cap="flat" cmpd="sng" algn="ctr">
+                      <a:solidFill>
+                        <a:srgbClr val="000000"/>
+                      </a:solidFill>
+                      <a:prstDash val="solid"/>
+                      <a:round/>
+                      <a:headEnd type="none" w="med" len="med"/>
+                      <a:tailEnd type="none" w="med" len="med"/>
+                    </a:lnB>
+                  </a:tcPr>
+                </a:tc>
+                <a:tc>
+                  <a:txBody>
+                    <a:bodyPr/>
+                    <a:lstStyle/>
+                    <a:p>
+                      <a:pPr algn="ctr" fontAlgn="ctr"/>
+                      <a:r>
+                        <a:rPr lang="en-US" sz="1400" b="0" i="0" u="none" strike="noStrike" dirty="0">
+                          <a:solidFill>
+                            <a:srgbClr val="000000"/>
+                          </a:solidFill>
+                          <a:effectLst/>
+                          <a:latin typeface="Source Sans Pro Regular" panose="020B0503030403020204" pitchFamily="34" charset="0"/>
+                        </a:rPr>
+                        <a:t>Location 2</a:t>
+                      </a:r>
+                    </a:p>
+                  </a:txBody>
+                  <a:tcPr marL="9525" marR="9525" marT="9525" marB="0" anchor="ctr">
+                    <a:lnL w="6350" cap="flat" cmpd="sng" algn="ctr">
+                      <a:solidFill>
+                        <a:srgbClr val="000000"/>
+                      </a:solidFill>
+                      <a:prstDash val="solid"/>
+                      <a:round/>
+                      <a:headEnd type="none" w="med" len="med"/>
+                      <a:tailEnd type="none" w="med" len="med"/>
+                    </a:lnL>
+                    <a:lnR w="6350" cap="flat" cmpd="sng" algn="ctr">
+                      <a:solidFill>
+                        <a:srgbClr val="000000"/>
+                      </a:solidFill>
+                      <a:prstDash val="solid"/>
+                      <a:round/>
+                      <a:headEnd type="none" w="med" len="med"/>
+                      <a:tailEnd type="none" w="med" len="med"/>
+                    </a:lnR>
+                    <a:lnT w="6350" cap="flat" cmpd="sng" algn="ctr">
+                      <a:solidFill>
+                        <a:srgbClr val="000000"/>
+                      </a:solidFill>
+                      <a:prstDash val="solid"/>
+                      <a:round/>
+                      <a:headEnd type="none" w="med" len="med"/>
+                      <a:tailEnd type="none" w="med" len="med"/>
+                    </a:lnT>
+                    <a:lnB w="6350" cap="flat" cmpd="sng" algn="ctr">
+                      <a:solidFill>
+                        <a:srgbClr val="000000"/>
+                      </a:solidFill>
+                      <a:prstDash val="solid"/>
+                      <a:round/>
+                      <a:headEnd type="none" w="med" len="med"/>
+                      <a:tailEnd type="none" w="med" len="med"/>
+                    </a:lnB>
+                  </a:tcPr>
+                </a:tc>
+                <a:tc>
+                  <a:txBody>
+                    <a:bodyPr/>
+                    <a:lstStyle/>
+                    <a:p>
+                      <a:pPr algn="ctr" fontAlgn="ctr"/>
+                      <a:r>
+                        <a:rPr lang="en-US" sz="1400" b="1" i="0" u="none" strike="noStrike">
+                          <a:solidFill>
+                            <a:srgbClr val="000000"/>
+                          </a:solidFill>
+                          <a:effectLst/>
+                          <a:latin typeface="Source Sans Pro Regular" panose="020B0503030403020204" pitchFamily="34" charset="0"/>
+                        </a:rPr>
+                        <a:t>…</a:t>
+                      </a:r>
+                    </a:p>
+                  </a:txBody>
+                  <a:tcPr marL="9525" marR="9525" marT="9525" marB="0" anchor="ctr">
+                    <a:lnL w="6350" cap="flat" cmpd="sng" algn="ctr">
+                      <a:solidFill>
+                        <a:srgbClr val="000000"/>
+                      </a:solidFill>
+                      <a:prstDash val="solid"/>
+                      <a:round/>
+                      <a:headEnd type="none" w="med" len="med"/>
+                      <a:tailEnd type="none" w="med" len="med"/>
+                    </a:lnL>
+                    <a:lnR w="6350" cap="flat" cmpd="sng" algn="ctr">
+                      <a:solidFill>
+                        <a:srgbClr val="000000"/>
+                      </a:solidFill>
+                      <a:prstDash val="solid"/>
+                      <a:round/>
+                      <a:headEnd type="none" w="med" len="med"/>
+                      <a:tailEnd type="none" w="med" len="med"/>
+                    </a:lnR>
+                    <a:lnT w="6350" cap="flat" cmpd="sng" algn="ctr">
+                      <a:solidFill>
+                        <a:srgbClr val="000000"/>
+                      </a:solidFill>
+                      <a:prstDash val="solid"/>
+                      <a:round/>
+                      <a:headEnd type="none" w="med" len="med"/>
+                      <a:tailEnd type="none" w="med" len="med"/>
+                    </a:lnT>
+                    <a:lnB w="6350" cap="flat" cmpd="sng" algn="ctr">
+                      <a:solidFill>
+                        <a:srgbClr val="000000"/>
+                      </a:solidFill>
+                      <a:prstDash val="solid"/>
+                      <a:round/>
+                      <a:headEnd type="none" w="med" len="med"/>
+                      <a:tailEnd type="none" w="med" len="med"/>
+                    </a:lnB>
+                  </a:tcPr>
+                </a:tc>
+                <a:tc>
+                  <a:txBody>
+                    <a:bodyPr/>
+                    <a:lstStyle/>
+                    <a:p>
+                      <a:pPr algn="ctr" fontAlgn="ctr"/>
+                      <a:r>
+                        <a:rPr lang="en-US" sz="1400" b="0" i="0" u="none" strike="noStrike">
+                          <a:solidFill>
+                            <a:srgbClr val="000000"/>
+                          </a:solidFill>
+                          <a:effectLst/>
+                          <a:latin typeface="Source Sans Pro Regular" panose="020B0503030403020204" pitchFamily="34" charset="0"/>
+                        </a:rPr>
+                        <a:t>Location n</a:t>
+                      </a:r>
+                    </a:p>
+                  </a:txBody>
+                  <a:tcPr marL="9525" marR="9525" marT="9525" marB="0" anchor="ctr">
+                    <a:lnL w="6350" cap="flat" cmpd="sng" algn="ctr">
+                      <a:solidFill>
+                        <a:srgbClr val="000000"/>
+                      </a:solidFill>
+                      <a:prstDash val="solid"/>
+                      <a:round/>
+                      <a:headEnd type="none" w="med" len="med"/>
+                      <a:tailEnd type="none" w="med" len="med"/>
+                    </a:lnL>
+                    <a:lnR w="6350" cap="flat" cmpd="sng" algn="ctr">
+                      <a:solidFill>
+                        <a:srgbClr val="000000"/>
+                      </a:solidFill>
+                      <a:prstDash val="solid"/>
+                      <a:round/>
+                      <a:headEnd type="none" w="med" len="med"/>
+                      <a:tailEnd type="none" w="med" len="med"/>
+                    </a:lnR>
+                    <a:lnT w="6350" cap="flat" cmpd="sng" algn="ctr">
+                      <a:solidFill>
+                        <a:srgbClr val="000000"/>
+                      </a:solidFill>
+                      <a:prstDash val="solid"/>
+                      <a:round/>
+                      <a:headEnd type="none" w="med" len="med"/>
+                      <a:tailEnd type="none" w="med" len="med"/>
+                    </a:lnT>
+                    <a:lnB w="6350" cap="flat" cmpd="sng" algn="ctr">
+                      <a:solidFill>
+                        <a:srgbClr val="000000"/>
+                      </a:solidFill>
+                      <a:prstDash val="solid"/>
+                      <a:round/>
+                      <a:headEnd type="none" w="med" len="med"/>
+                      <a:tailEnd type="none" w="med" len="med"/>
+                    </a:lnB>
+                  </a:tcPr>
+                </a:tc>
+                <a:extLst>
+                  <a:ext uri="{0D108BD9-81ED-4DB2-BD59-A6C34878D82A}">
+                    <a16:rowId xmlns:a16="http://schemas.microsoft.com/office/drawing/2014/main" val="2023526993"/>
+                  </a:ext>
+                </a:extLst>
+              </a:tr>
+              <a:tr h="508000">
+                <a:tc>
+                  <a:txBody>
+                    <a:bodyPr/>
+                    <a:lstStyle/>
+                    <a:p>
+                      <a:pPr algn="ctr" fontAlgn="ctr"/>
+                      <a:r>
+                        <a:rPr lang="en-US" sz="1400" b="0" i="0" u="none" strike="noStrike">
+                          <a:solidFill>
+                            <a:srgbClr val="000000"/>
+                          </a:solidFill>
+                          <a:effectLst/>
+                          <a:latin typeface="Source Sans Pro Regular" panose="020B0503030403020204" pitchFamily="34" charset="0"/>
+                        </a:rPr>
+                        <a:t>Location 1</a:t>
+                      </a:r>
+                    </a:p>
+                  </a:txBody>
+                  <a:tcPr marL="9525" marR="9525" marT="9525" marB="0" anchor="ctr">
+                    <a:lnL w="6350" cap="flat" cmpd="sng" algn="ctr">
+                      <a:solidFill>
+                        <a:srgbClr val="000000"/>
+                      </a:solidFill>
+                      <a:prstDash val="solid"/>
+                      <a:round/>
+                      <a:headEnd type="none" w="med" len="med"/>
+                      <a:tailEnd type="none" w="med" len="med"/>
+                    </a:lnL>
+                    <a:lnR w="6350" cap="flat" cmpd="sng" algn="ctr">
+                      <a:solidFill>
+                        <a:srgbClr val="000000"/>
+                      </a:solidFill>
+                      <a:prstDash val="solid"/>
+                      <a:round/>
+                      <a:headEnd type="none" w="med" len="med"/>
+                      <a:tailEnd type="none" w="med" len="med"/>
+                    </a:lnR>
+                    <a:lnT w="6350" cap="flat" cmpd="sng" algn="ctr">
+                      <a:solidFill>
+                        <a:srgbClr val="000000"/>
+                      </a:solidFill>
+                      <a:prstDash val="solid"/>
+                      <a:round/>
+                      <a:headEnd type="none" w="med" len="med"/>
+                      <a:tailEnd type="none" w="med" len="med"/>
+                    </a:lnT>
+                    <a:lnB w="6350" cap="flat" cmpd="sng" algn="ctr">
+                      <a:solidFill>
+                        <a:srgbClr val="000000"/>
+                      </a:solidFill>
+                      <a:prstDash val="solid"/>
+                      <a:round/>
+                      <a:headEnd type="none" w="med" len="med"/>
+                      <a:tailEnd type="none" w="med" len="med"/>
+                    </a:lnB>
+                  </a:tcPr>
+                </a:tc>
+                <a:tc>
+                  <a:txBody>
+                    <a:bodyPr/>
+                    <a:lstStyle/>
+                    <a:p>
+                      <a:pPr algn="ctr" fontAlgn="ctr"/>
+                      <a:r>
+                        <a:rPr lang="en-US" sz="2000" b="0" i="0" u="none" strike="noStrike">
+                          <a:solidFill>
+                            <a:srgbClr val="000000"/>
+                          </a:solidFill>
+                          <a:effectLst/>
+                          <a:latin typeface="Source Sans Pro Regular" panose="020B0503030403020204" pitchFamily="34" charset="0"/>
+                        </a:rPr>
+                        <a:t>0</a:t>
+                      </a:r>
+                    </a:p>
+                  </a:txBody>
+                  <a:tcPr marL="9525" marR="9525" marT="9525" marB="0" anchor="ctr">
+                    <a:lnL w="6350" cap="flat" cmpd="sng" algn="ctr">
+                      <a:solidFill>
+                        <a:srgbClr val="000000"/>
+                      </a:solidFill>
+                      <a:prstDash val="solid"/>
+                      <a:round/>
+                      <a:headEnd type="none" w="med" len="med"/>
+                      <a:tailEnd type="none" w="med" len="med"/>
+                    </a:lnL>
+                    <a:lnR w="6350" cap="flat" cmpd="sng" algn="ctr">
+                      <a:solidFill>
+                        <a:srgbClr val="000000"/>
+                      </a:solidFill>
+                      <a:prstDash val="solid"/>
+                      <a:round/>
+                      <a:headEnd type="none" w="med" len="med"/>
+                      <a:tailEnd type="none" w="med" len="med"/>
+                    </a:lnR>
+                    <a:lnT w="6350" cap="flat" cmpd="sng" algn="ctr">
+                      <a:solidFill>
+                        <a:srgbClr val="000000"/>
+                      </a:solidFill>
+                      <a:prstDash val="solid"/>
+                      <a:round/>
+                      <a:headEnd type="none" w="med" len="med"/>
+                      <a:tailEnd type="none" w="med" len="med"/>
+                    </a:lnT>
+                    <a:lnB w="6350" cap="flat" cmpd="sng" algn="ctr">
+                      <a:solidFill>
+                        <a:srgbClr val="000000"/>
+                      </a:solidFill>
+                      <a:prstDash val="solid"/>
+                      <a:round/>
+                      <a:headEnd type="none" w="med" len="med"/>
+                      <a:tailEnd type="none" w="med" len="med"/>
+                    </a:lnB>
+                  </a:tcPr>
+                </a:tc>
+                <a:tc>
+                  <a:txBody>
+                    <a:bodyPr/>
+                    <a:lstStyle/>
+                    <a:p>
+                      <a:pPr algn="ctr" fontAlgn="ctr"/>
+                      <a:r>
+                        <a:rPr lang="en-US" sz="2000" b="0" i="0" u="none" strike="noStrike">
+                          <a:solidFill>
+                            <a:srgbClr val="000000"/>
+                          </a:solidFill>
+                          <a:effectLst/>
+                          <a:latin typeface="Source Sans Pro Regular" panose="020B0503030403020204" pitchFamily="34" charset="0"/>
+                        </a:rPr>
+                        <a:t>-</a:t>
+                      </a:r>
+                    </a:p>
+                  </a:txBody>
+                  <a:tcPr marL="9525" marR="9525" marT="9525" marB="0" anchor="ctr">
+                    <a:lnL w="6350" cap="flat" cmpd="sng" algn="ctr">
+                      <a:solidFill>
+                        <a:srgbClr val="000000"/>
+                      </a:solidFill>
+                      <a:prstDash val="solid"/>
+                      <a:round/>
+                      <a:headEnd type="none" w="med" len="med"/>
+                      <a:tailEnd type="none" w="med" len="med"/>
+                    </a:lnL>
+                    <a:lnR w="6350" cap="flat" cmpd="sng" algn="ctr">
+                      <a:solidFill>
+                        <a:srgbClr val="000000"/>
+                      </a:solidFill>
+                      <a:prstDash val="solid"/>
+                      <a:round/>
+                      <a:headEnd type="none" w="med" len="med"/>
+                      <a:tailEnd type="none" w="med" len="med"/>
+                    </a:lnR>
+                    <a:lnT w="6350" cap="flat" cmpd="sng" algn="ctr">
+                      <a:solidFill>
+                        <a:srgbClr val="000000"/>
+                      </a:solidFill>
+                      <a:prstDash val="solid"/>
+                      <a:round/>
+                      <a:headEnd type="none" w="med" len="med"/>
+                      <a:tailEnd type="none" w="med" len="med"/>
+                    </a:lnT>
+                    <a:lnB w="6350" cap="flat" cmpd="sng" algn="ctr">
+                      <a:solidFill>
+                        <a:srgbClr val="000000"/>
+                      </a:solidFill>
+                      <a:prstDash val="solid"/>
+                      <a:round/>
+                      <a:headEnd type="none" w="med" len="med"/>
+                      <a:tailEnd type="none" w="med" len="med"/>
+                    </a:lnB>
+                  </a:tcPr>
+                </a:tc>
+                <a:tc>
+                  <a:txBody>
+                    <a:bodyPr/>
+                    <a:lstStyle/>
+                    <a:p>
+                      <a:pPr algn="ctr" fontAlgn="ctr"/>
+                      <a:r>
+                        <a:rPr lang="en-US" sz="1400" b="1" i="0" u="none" strike="noStrike">
+                          <a:solidFill>
+                            <a:srgbClr val="000000"/>
+                          </a:solidFill>
+                          <a:effectLst/>
+                          <a:latin typeface="Source Sans Pro Regular" panose="020B0503030403020204" pitchFamily="34" charset="0"/>
+                        </a:rPr>
+                        <a:t>…</a:t>
+                      </a:r>
+                    </a:p>
+                  </a:txBody>
+                  <a:tcPr marL="9525" marR="9525" marT="9525" marB="0" anchor="ctr">
+                    <a:lnL w="6350" cap="flat" cmpd="sng" algn="ctr">
+                      <a:solidFill>
+                        <a:srgbClr val="000000"/>
+                      </a:solidFill>
+                      <a:prstDash val="solid"/>
+                      <a:round/>
+                      <a:headEnd type="none" w="med" len="med"/>
+                      <a:tailEnd type="none" w="med" len="med"/>
+                    </a:lnL>
+                    <a:lnR w="6350" cap="flat" cmpd="sng" algn="ctr">
+                      <a:solidFill>
+                        <a:srgbClr val="000000"/>
+                      </a:solidFill>
+                      <a:prstDash val="solid"/>
+                      <a:round/>
+                      <a:headEnd type="none" w="med" len="med"/>
+                      <a:tailEnd type="none" w="med" len="med"/>
+                    </a:lnR>
+                    <a:lnT w="6350" cap="flat" cmpd="sng" algn="ctr">
+                      <a:solidFill>
+                        <a:srgbClr val="000000"/>
+                      </a:solidFill>
+                      <a:prstDash val="solid"/>
+                      <a:round/>
+                      <a:headEnd type="none" w="med" len="med"/>
+                      <a:tailEnd type="none" w="med" len="med"/>
+                    </a:lnT>
+                    <a:lnB w="6350" cap="flat" cmpd="sng" algn="ctr">
+                      <a:solidFill>
+                        <a:srgbClr val="000000"/>
+                      </a:solidFill>
+                      <a:prstDash val="solid"/>
+                      <a:round/>
+                      <a:headEnd type="none" w="med" len="med"/>
+                      <a:tailEnd type="none" w="med" len="med"/>
+                    </a:lnB>
+                  </a:tcPr>
+                </a:tc>
+                <a:tc>
+                  <a:txBody>
+                    <a:bodyPr/>
+                    <a:lstStyle/>
+                    <a:p>
+                      <a:pPr algn="ctr" fontAlgn="ctr"/>
+                      <a:r>
+                        <a:rPr lang="en-US" sz="2000" b="0" i="0" u="none" strike="noStrike">
+                          <a:solidFill>
+                            <a:srgbClr val="000000"/>
+                          </a:solidFill>
+                          <a:effectLst/>
+                          <a:latin typeface="Source Sans Pro Regular" panose="020B0503030403020204" pitchFamily="34" charset="0"/>
+                        </a:rPr>
+                        <a:t>-</a:t>
+                      </a:r>
+                    </a:p>
+                  </a:txBody>
+                  <a:tcPr marL="9525" marR="9525" marT="9525" marB="0" anchor="ctr">
+                    <a:lnL w="6350" cap="flat" cmpd="sng" algn="ctr">
+                      <a:solidFill>
+                        <a:srgbClr val="000000"/>
+                      </a:solidFill>
+                      <a:prstDash val="solid"/>
+                      <a:round/>
+                      <a:headEnd type="none" w="med" len="med"/>
+                      <a:tailEnd type="none" w="med" len="med"/>
+                    </a:lnL>
+                    <a:lnR w="6350" cap="flat" cmpd="sng" algn="ctr">
+                      <a:solidFill>
+                        <a:srgbClr val="000000"/>
+                      </a:solidFill>
+                      <a:prstDash val="solid"/>
+                      <a:round/>
+                      <a:headEnd type="none" w="med" len="med"/>
+                      <a:tailEnd type="none" w="med" len="med"/>
+                    </a:lnR>
+                    <a:lnT w="6350" cap="flat" cmpd="sng" algn="ctr">
+                      <a:solidFill>
+                        <a:srgbClr val="000000"/>
+                      </a:solidFill>
+                      <a:prstDash val="solid"/>
+                      <a:round/>
+                      <a:headEnd type="none" w="med" len="med"/>
+                      <a:tailEnd type="none" w="med" len="med"/>
+                    </a:lnT>
+                    <a:lnB w="6350" cap="flat" cmpd="sng" algn="ctr">
+                      <a:solidFill>
+                        <a:srgbClr val="000000"/>
+                      </a:solidFill>
+                      <a:prstDash val="solid"/>
+                      <a:round/>
+                      <a:headEnd type="none" w="med" len="med"/>
+                      <a:tailEnd type="none" w="med" len="med"/>
+                    </a:lnB>
+                  </a:tcPr>
+                </a:tc>
+                <a:extLst>
+                  <a:ext uri="{0D108BD9-81ED-4DB2-BD59-A6C34878D82A}">
+                    <a16:rowId xmlns:a16="http://schemas.microsoft.com/office/drawing/2014/main" val="849575166"/>
+                  </a:ext>
+                </a:extLst>
+              </a:tr>
+              <a:tr h="508000">
+                <a:tc>
+                  <a:txBody>
+                    <a:bodyPr/>
+                    <a:lstStyle/>
+                    <a:p>
+                      <a:pPr algn="ctr" fontAlgn="ctr"/>
+                      <a:r>
+                        <a:rPr lang="en-US" sz="1400" b="0" i="0" u="none" strike="noStrike">
+                          <a:solidFill>
+                            <a:srgbClr val="000000"/>
+                          </a:solidFill>
+                          <a:effectLst/>
+                          <a:latin typeface="Source Sans Pro Regular" panose="020B0503030403020204" pitchFamily="34" charset="0"/>
+                        </a:rPr>
+                        <a:t>Location 2</a:t>
+                      </a:r>
+                    </a:p>
+                  </a:txBody>
+                  <a:tcPr marL="9525" marR="9525" marT="9525" marB="0" anchor="ctr">
+                    <a:lnL w="6350" cap="flat" cmpd="sng" algn="ctr">
+                      <a:solidFill>
+                        <a:srgbClr val="000000"/>
+                      </a:solidFill>
+                      <a:prstDash val="solid"/>
+                      <a:round/>
+                      <a:headEnd type="none" w="med" len="med"/>
+                      <a:tailEnd type="none" w="med" len="med"/>
+                    </a:lnL>
+                    <a:lnR w="6350" cap="flat" cmpd="sng" algn="ctr">
+                      <a:solidFill>
+                        <a:srgbClr val="000000"/>
+                      </a:solidFill>
+                      <a:prstDash val="solid"/>
+                      <a:round/>
+                      <a:headEnd type="none" w="med" len="med"/>
+                      <a:tailEnd type="none" w="med" len="med"/>
+                    </a:lnR>
+                    <a:lnT w="6350" cap="flat" cmpd="sng" algn="ctr">
+                      <a:solidFill>
+                        <a:srgbClr val="000000"/>
+                      </a:solidFill>
+                      <a:prstDash val="solid"/>
+                      <a:round/>
+                      <a:headEnd type="none" w="med" len="med"/>
+                      <a:tailEnd type="none" w="med" len="med"/>
+                    </a:lnT>
+                    <a:lnB w="6350" cap="flat" cmpd="sng" algn="ctr">
+                      <a:solidFill>
+                        <a:srgbClr val="000000"/>
+                      </a:solidFill>
+                      <a:prstDash val="solid"/>
+                      <a:round/>
+                      <a:headEnd type="none" w="med" len="med"/>
+                      <a:tailEnd type="none" w="med" len="med"/>
+                    </a:lnB>
+                  </a:tcPr>
+                </a:tc>
+                <a:tc>
+                  <a:txBody>
+                    <a:bodyPr/>
+                    <a:lstStyle/>
+                    <a:p>
+                      <a:pPr algn="ctr" fontAlgn="ctr"/>
+                      <a:r>
+                        <a:rPr lang="en-US" sz="2000" b="0" i="0" u="none" strike="noStrike">
+                          <a:solidFill>
+                            <a:srgbClr val="000000"/>
+                          </a:solidFill>
+                          <a:effectLst/>
+                          <a:latin typeface="Source Sans Pro Regular" panose="020B0503030403020204" pitchFamily="34" charset="0"/>
+                        </a:rPr>
+                        <a:t>3</a:t>
+                      </a:r>
+                    </a:p>
+                  </a:txBody>
+                  <a:tcPr marL="9525" marR="9525" marT="9525" marB="0" anchor="ctr">
+                    <a:lnL w="6350" cap="flat" cmpd="sng" algn="ctr">
+                      <a:solidFill>
+                        <a:srgbClr val="000000"/>
+                      </a:solidFill>
+                      <a:prstDash val="solid"/>
+                      <a:round/>
+                      <a:headEnd type="none" w="med" len="med"/>
+                      <a:tailEnd type="none" w="med" len="med"/>
+                    </a:lnL>
+                    <a:lnR w="6350" cap="flat" cmpd="sng" algn="ctr">
+                      <a:solidFill>
+                        <a:srgbClr val="000000"/>
+                      </a:solidFill>
+                      <a:prstDash val="solid"/>
+                      <a:round/>
+                      <a:headEnd type="none" w="med" len="med"/>
+                      <a:tailEnd type="none" w="med" len="med"/>
+                    </a:lnR>
+                    <a:lnT w="6350" cap="flat" cmpd="sng" algn="ctr">
+                      <a:solidFill>
+                        <a:srgbClr val="000000"/>
+                      </a:solidFill>
+                      <a:prstDash val="solid"/>
+                      <a:round/>
+                      <a:headEnd type="none" w="med" len="med"/>
+                      <a:tailEnd type="none" w="med" len="med"/>
+                    </a:lnT>
+                    <a:lnB w="6350" cap="flat" cmpd="sng" algn="ctr">
+                      <a:solidFill>
+                        <a:srgbClr val="000000"/>
+                      </a:solidFill>
+                      <a:prstDash val="solid"/>
+                      <a:round/>
+                      <a:headEnd type="none" w="med" len="med"/>
+                      <a:tailEnd type="none" w="med" len="med"/>
+                    </a:lnB>
+                  </a:tcPr>
+                </a:tc>
+                <a:tc>
+                  <a:txBody>
+                    <a:bodyPr/>
+                    <a:lstStyle/>
+                    <a:p>
+                      <a:pPr algn="ctr" fontAlgn="ctr"/>
+                      <a:r>
+                        <a:rPr lang="en-US" sz="2000" b="0" i="0" u="none" strike="noStrike">
+                          <a:solidFill>
+                            <a:srgbClr val="000000"/>
+                          </a:solidFill>
+                          <a:effectLst/>
+                          <a:latin typeface="Source Sans Pro Regular" panose="020B0503030403020204" pitchFamily="34" charset="0"/>
+                        </a:rPr>
+                        <a:t>0</a:t>
+                      </a:r>
+                    </a:p>
+                  </a:txBody>
+                  <a:tcPr marL="9525" marR="9525" marT="9525" marB="0" anchor="ctr">
+                    <a:lnL w="6350" cap="flat" cmpd="sng" algn="ctr">
+                      <a:solidFill>
+                        <a:srgbClr val="000000"/>
+                      </a:solidFill>
+                      <a:prstDash val="solid"/>
+                      <a:round/>
+                      <a:headEnd type="none" w="med" len="med"/>
+                      <a:tailEnd type="none" w="med" len="med"/>
+                    </a:lnL>
+                    <a:lnR w="6350" cap="flat" cmpd="sng" algn="ctr">
+                      <a:solidFill>
+                        <a:srgbClr val="000000"/>
+                      </a:solidFill>
+                      <a:prstDash val="solid"/>
+                      <a:round/>
+                      <a:headEnd type="none" w="med" len="med"/>
+                      <a:tailEnd type="none" w="med" len="med"/>
+                    </a:lnR>
+                    <a:lnT w="6350" cap="flat" cmpd="sng" algn="ctr">
+                      <a:solidFill>
+                        <a:srgbClr val="000000"/>
+                      </a:solidFill>
+                      <a:prstDash val="solid"/>
+                      <a:round/>
+                      <a:headEnd type="none" w="med" len="med"/>
+                      <a:tailEnd type="none" w="med" len="med"/>
+                    </a:lnT>
+                    <a:lnB w="6350" cap="flat" cmpd="sng" algn="ctr">
+                      <a:solidFill>
+                        <a:srgbClr val="000000"/>
+                      </a:solidFill>
+                      <a:prstDash val="solid"/>
+                      <a:round/>
+                      <a:headEnd type="none" w="med" len="med"/>
+                      <a:tailEnd type="none" w="med" len="med"/>
+                    </a:lnB>
+                  </a:tcPr>
+                </a:tc>
+                <a:tc>
+                  <a:txBody>
+                    <a:bodyPr/>
+                    <a:lstStyle/>
+                    <a:p>
+                      <a:pPr algn="ctr" fontAlgn="ctr"/>
+                      <a:r>
+                        <a:rPr lang="en-US" sz="1400" b="1" i="0" u="none" strike="noStrike">
+                          <a:solidFill>
+                            <a:srgbClr val="000000"/>
+                          </a:solidFill>
+                          <a:effectLst/>
+                          <a:latin typeface="Source Sans Pro Regular" panose="020B0503030403020204" pitchFamily="34" charset="0"/>
+                        </a:rPr>
+                        <a:t>…</a:t>
+                      </a:r>
+                    </a:p>
+                  </a:txBody>
+                  <a:tcPr marL="9525" marR="9525" marT="9525" marB="0" anchor="ctr">
+                    <a:lnL w="6350" cap="flat" cmpd="sng" algn="ctr">
+                      <a:solidFill>
+                        <a:srgbClr val="000000"/>
+                      </a:solidFill>
+                      <a:prstDash val="solid"/>
+                      <a:round/>
+                      <a:headEnd type="none" w="med" len="med"/>
+                      <a:tailEnd type="none" w="med" len="med"/>
+                    </a:lnL>
+                    <a:lnR w="6350" cap="flat" cmpd="sng" algn="ctr">
+                      <a:solidFill>
+                        <a:srgbClr val="000000"/>
+                      </a:solidFill>
+                      <a:prstDash val="solid"/>
+                      <a:round/>
+                      <a:headEnd type="none" w="med" len="med"/>
+                      <a:tailEnd type="none" w="med" len="med"/>
+                    </a:lnR>
+                    <a:lnT w="6350" cap="flat" cmpd="sng" algn="ctr">
+                      <a:solidFill>
+                        <a:srgbClr val="000000"/>
+                      </a:solidFill>
+                      <a:prstDash val="solid"/>
+                      <a:round/>
+                      <a:headEnd type="none" w="med" len="med"/>
+                      <a:tailEnd type="none" w="med" len="med"/>
+                    </a:lnT>
+                    <a:lnB w="6350" cap="flat" cmpd="sng" algn="ctr">
+                      <a:solidFill>
+                        <a:srgbClr val="000000"/>
+                      </a:solidFill>
+                      <a:prstDash val="solid"/>
+                      <a:round/>
+                      <a:headEnd type="none" w="med" len="med"/>
+                      <a:tailEnd type="none" w="med" len="med"/>
+                    </a:lnB>
+                  </a:tcPr>
+                </a:tc>
+                <a:tc>
+                  <a:txBody>
+                    <a:bodyPr/>
+                    <a:lstStyle/>
+                    <a:p>
+                      <a:pPr algn="ctr" fontAlgn="ctr"/>
+                      <a:r>
+                        <a:rPr lang="en-US" sz="2000" b="0" i="0" u="none" strike="noStrike">
+                          <a:solidFill>
+                            <a:srgbClr val="000000"/>
+                          </a:solidFill>
+                          <a:effectLst/>
+                          <a:latin typeface="Source Sans Pro Regular" panose="020B0503030403020204" pitchFamily="34" charset="0"/>
+                        </a:rPr>
+                        <a:t>-</a:t>
+                      </a:r>
+                    </a:p>
+                  </a:txBody>
+                  <a:tcPr marL="9525" marR="9525" marT="9525" marB="0" anchor="ctr">
+                    <a:lnL w="6350" cap="flat" cmpd="sng" algn="ctr">
+                      <a:solidFill>
+                        <a:srgbClr val="000000"/>
+                      </a:solidFill>
+                      <a:prstDash val="solid"/>
+                      <a:round/>
+                      <a:headEnd type="none" w="med" len="med"/>
+                      <a:tailEnd type="none" w="med" len="med"/>
+                    </a:lnL>
+                    <a:lnR w="6350" cap="flat" cmpd="sng" algn="ctr">
+                      <a:solidFill>
+                        <a:srgbClr val="000000"/>
+                      </a:solidFill>
+                      <a:prstDash val="solid"/>
+                      <a:round/>
+                      <a:headEnd type="none" w="med" len="med"/>
+                      <a:tailEnd type="none" w="med" len="med"/>
+                    </a:lnR>
+                    <a:lnT w="6350" cap="flat" cmpd="sng" algn="ctr">
+                      <a:solidFill>
+                        <a:srgbClr val="000000"/>
+                      </a:solidFill>
+                      <a:prstDash val="solid"/>
+                      <a:round/>
+                      <a:headEnd type="none" w="med" len="med"/>
+                      <a:tailEnd type="none" w="med" len="med"/>
+                    </a:lnT>
+                    <a:lnB w="6350" cap="flat" cmpd="sng" algn="ctr">
+                      <a:solidFill>
+                        <a:srgbClr val="000000"/>
+                      </a:solidFill>
+                      <a:prstDash val="solid"/>
+                      <a:round/>
+                      <a:headEnd type="none" w="med" len="med"/>
+                      <a:tailEnd type="none" w="med" len="med"/>
+                    </a:lnB>
+                  </a:tcPr>
+                </a:tc>
+                <a:extLst>
+                  <a:ext uri="{0D108BD9-81ED-4DB2-BD59-A6C34878D82A}">
+                    <a16:rowId xmlns:a16="http://schemas.microsoft.com/office/drawing/2014/main" val="918505573"/>
+                  </a:ext>
+                </a:extLst>
+              </a:tr>
+              <a:tr h="508000">
+                <a:tc>
+                  <a:txBody>
+                    <a:bodyPr/>
+                    <a:lstStyle/>
+                    <a:p>
+                      <a:pPr algn="ctr" fontAlgn="ctr"/>
+                      <a:r>
+                        <a:rPr lang="en-US" sz="2800" b="1" i="0" u="none" strike="noStrike">
+                          <a:solidFill>
+                            <a:srgbClr val="545454"/>
+                          </a:solidFill>
+                          <a:effectLst/>
+                          <a:latin typeface="Source Sans Pro Regular" panose="020B0503030403020204" pitchFamily="34" charset="0"/>
+                        </a:rPr>
+                        <a:t>⋮</a:t>
+                      </a:r>
+                    </a:p>
+                  </a:txBody>
+                  <a:tcPr marL="9525" marR="9525" marT="9525" marB="0" anchor="ctr">
+                    <a:lnL w="6350" cap="flat" cmpd="sng" algn="ctr">
+                      <a:solidFill>
+                        <a:srgbClr val="000000"/>
+                      </a:solidFill>
+                      <a:prstDash val="solid"/>
+                      <a:round/>
+                      <a:headEnd type="none" w="med" len="med"/>
+                      <a:tailEnd type="none" w="med" len="med"/>
+                    </a:lnL>
+                    <a:lnR w="6350" cap="flat" cmpd="sng" algn="ctr">
+                      <a:solidFill>
+                        <a:srgbClr val="000000"/>
+                      </a:solidFill>
+                      <a:prstDash val="solid"/>
+                      <a:round/>
+                      <a:headEnd type="none" w="med" len="med"/>
+                      <a:tailEnd type="none" w="med" len="med"/>
+                    </a:lnR>
+                    <a:lnT w="6350" cap="flat" cmpd="sng" algn="ctr">
+                      <a:solidFill>
+                        <a:srgbClr val="000000"/>
+                      </a:solidFill>
+                      <a:prstDash val="solid"/>
+                      <a:round/>
+                      <a:headEnd type="none" w="med" len="med"/>
+                      <a:tailEnd type="none" w="med" len="med"/>
+                    </a:lnT>
+                    <a:lnB w="6350" cap="flat" cmpd="sng" algn="ctr">
+                      <a:solidFill>
+                        <a:srgbClr val="000000"/>
+                      </a:solidFill>
+                      <a:prstDash val="solid"/>
+                      <a:round/>
+                      <a:headEnd type="none" w="med" len="med"/>
+                      <a:tailEnd type="none" w="med" len="med"/>
+                    </a:lnB>
+                  </a:tcPr>
+                </a:tc>
+                <a:tc>
+                  <a:txBody>
+                    <a:bodyPr/>
+                    <a:lstStyle/>
+                    <a:p>
+                      <a:pPr algn="ctr" fontAlgn="ctr"/>
+                      <a:r>
+                        <a:rPr lang="en-US" sz="2800" b="1" i="0" u="none" strike="noStrike">
+                          <a:solidFill>
+                            <a:srgbClr val="545454"/>
+                          </a:solidFill>
+                          <a:effectLst/>
+                          <a:latin typeface="Source Sans Pro Regular" panose="020B0503030403020204" pitchFamily="34" charset="0"/>
+                        </a:rPr>
+                        <a:t>⋮</a:t>
+                      </a:r>
+                    </a:p>
+                  </a:txBody>
+                  <a:tcPr marL="9525" marR="9525" marT="9525" marB="0" anchor="ctr">
+                    <a:lnL w="6350" cap="flat" cmpd="sng" algn="ctr">
+                      <a:solidFill>
+                        <a:srgbClr val="000000"/>
+                      </a:solidFill>
+                      <a:prstDash val="solid"/>
+                      <a:round/>
+                      <a:headEnd type="none" w="med" len="med"/>
+                      <a:tailEnd type="none" w="med" len="med"/>
+                    </a:lnL>
+                    <a:lnR w="6350" cap="flat" cmpd="sng" algn="ctr">
+                      <a:solidFill>
+                        <a:srgbClr val="000000"/>
+                      </a:solidFill>
+                      <a:prstDash val="solid"/>
+                      <a:round/>
+                      <a:headEnd type="none" w="med" len="med"/>
+                      <a:tailEnd type="none" w="med" len="med"/>
+                    </a:lnR>
+                    <a:lnT w="6350" cap="flat" cmpd="sng" algn="ctr">
+                      <a:solidFill>
+                        <a:srgbClr val="000000"/>
+                      </a:solidFill>
+                      <a:prstDash val="solid"/>
+                      <a:round/>
+                      <a:headEnd type="none" w="med" len="med"/>
+                      <a:tailEnd type="none" w="med" len="med"/>
+                    </a:lnT>
+                    <a:lnB w="6350" cap="flat" cmpd="sng" algn="ctr">
+                      <a:solidFill>
+                        <a:srgbClr val="000000"/>
+                      </a:solidFill>
+                      <a:prstDash val="solid"/>
+                      <a:round/>
+                      <a:headEnd type="none" w="med" len="med"/>
+                      <a:tailEnd type="none" w="med" len="med"/>
+                    </a:lnB>
+                  </a:tcPr>
+                </a:tc>
+                <a:tc>
+                  <a:txBody>
+                    <a:bodyPr/>
+                    <a:lstStyle/>
+                    <a:p>
+                      <a:pPr algn="ctr" fontAlgn="ctr"/>
+                      <a:r>
+                        <a:rPr lang="en-US" sz="2800" b="1" i="0" u="none" strike="noStrike">
+                          <a:solidFill>
+                            <a:srgbClr val="545454"/>
+                          </a:solidFill>
+                          <a:effectLst/>
+                          <a:latin typeface="Source Sans Pro Regular" panose="020B0503030403020204" pitchFamily="34" charset="0"/>
+                        </a:rPr>
+                        <a:t>⋮</a:t>
+                      </a:r>
+                    </a:p>
+                  </a:txBody>
+                  <a:tcPr marL="9525" marR="9525" marT="9525" marB="0" anchor="ctr">
+                    <a:lnL w="6350" cap="flat" cmpd="sng" algn="ctr">
+                      <a:solidFill>
+                        <a:srgbClr val="000000"/>
+                      </a:solidFill>
+                      <a:prstDash val="solid"/>
+                      <a:round/>
+                      <a:headEnd type="none" w="med" len="med"/>
+                      <a:tailEnd type="none" w="med" len="med"/>
+                    </a:lnL>
+                    <a:lnR w="6350" cap="flat" cmpd="sng" algn="ctr">
+                      <a:solidFill>
+                        <a:srgbClr val="000000"/>
+                      </a:solidFill>
+                      <a:prstDash val="solid"/>
+                      <a:round/>
+                      <a:headEnd type="none" w="med" len="med"/>
+                      <a:tailEnd type="none" w="med" len="med"/>
+                    </a:lnR>
+                    <a:lnT w="6350" cap="flat" cmpd="sng" algn="ctr">
+                      <a:solidFill>
+                        <a:srgbClr val="000000"/>
+                      </a:solidFill>
+                      <a:prstDash val="solid"/>
+                      <a:round/>
+                      <a:headEnd type="none" w="med" len="med"/>
+                      <a:tailEnd type="none" w="med" len="med"/>
+                    </a:lnT>
+                    <a:lnB w="6350" cap="flat" cmpd="sng" algn="ctr">
+                      <a:solidFill>
+                        <a:srgbClr val="000000"/>
+                      </a:solidFill>
+                      <a:prstDash val="solid"/>
+                      <a:round/>
+                      <a:headEnd type="none" w="med" len="med"/>
+                      <a:tailEnd type="none" w="med" len="med"/>
+                    </a:lnB>
+                  </a:tcPr>
+                </a:tc>
+                <a:tc>
+                  <a:txBody>
+                    <a:bodyPr/>
+                    <a:lstStyle/>
+                    <a:p>
+                      <a:pPr algn="ctr" fontAlgn="ctr"/>
+                      <a:r>
+                        <a:rPr lang="en-US" sz="2000" b="0" i="0" u="none" strike="noStrike">
+                          <a:solidFill>
+                            <a:srgbClr val="000000"/>
+                          </a:solidFill>
+                          <a:effectLst/>
+                          <a:latin typeface="Source Sans Pro Regular" panose="020B0503030403020204" pitchFamily="34" charset="0"/>
+                        </a:rPr>
+                        <a:t>0</a:t>
+                      </a:r>
+                    </a:p>
+                  </a:txBody>
+                  <a:tcPr marL="9525" marR="9525" marT="9525" marB="0" anchor="ctr">
+                    <a:lnL w="6350" cap="flat" cmpd="sng" algn="ctr">
+                      <a:solidFill>
+                        <a:srgbClr val="000000"/>
+                      </a:solidFill>
+                      <a:prstDash val="solid"/>
+                      <a:round/>
+                      <a:headEnd type="none" w="med" len="med"/>
+                      <a:tailEnd type="none" w="med" len="med"/>
+                    </a:lnL>
+                    <a:lnR w="6350" cap="flat" cmpd="sng" algn="ctr">
+                      <a:solidFill>
+                        <a:srgbClr val="000000"/>
+                      </a:solidFill>
+                      <a:prstDash val="solid"/>
+                      <a:round/>
+                      <a:headEnd type="none" w="med" len="med"/>
+                      <a:tailEnd type="none" w="med" len="med"/>
+                    </a:lnR>
+                    <a:lnT w="6350" cap="flat" cmpd="sng" algn="ctr">
+                      <a:solidFill>
+                        <a:srgbClr val="000000"/>
+                      </a:solidFill>
+                      <a:prstDash val="solid"/>
+                      <a:round/>
+                      <a:headEnd type="none" w="med" len="med"/>
+                      <a:tailEnd type="none" w="med" len="med"/>
+                    </a:lnT>
+                    <a:lnB w="6350" cap="flat" cmpd="sng" algn="ctr">
+                      <a:solidFill>
+                        <a:srgbClr val="000000"/>
+                      </a:solidFill>
+                      <a:prstDash val="solid"/>
+                      <a:round/>
+                      <a:headEnd type="none" w="med" len="med"/>
+                      <a:tailEnd type="none" w="med" len="med"/>
+                    </a:lnB>
+                  </a:tcPr>
+                </a:tc>
+                <a:tc>
+                  <a:txBody>
+                    <a:bodyPr/>
+                    <a:lstStyle/>
+                    <a:p>
+                      <a:pPr algn="ctr" fontAlgn="ctr"/>
+                      <a:r>
+                        <a:rPr lang="en-US" sz="2000" b="0" i="0" u="none" strike="noStrike">
+                          <a:solidFill>
+                            <a:srgbClr val="000000"/>
+                          </a:solidFill>
+                          <a:effectLst/>
+                          <a:latin typeface="Source Sans Pro Regular" panose="020B0503030403020204" pitchFamily="34" charset="0"/>
+                        </a:rPr>
+                        <a:t>-</a:t>
+                      </a:r>
+                    </a:p>
+                  </a:txBody>
+                  <a:tcPr marL="9525" marR="9525" marT="9525" marB="0" anchor="ctr">
+                    <a:lnL w="6350" cap="flat" cmpd="sng" algn="ctr">
+                      <a:solidFill>
+                        <a:srgbClr val="000000"/>
+                      </a:solidFill>
+                      <a:prstDash val="solid"/>
+                      <a:round/>
+                      <a:headEnd type="none" w="med" len="med"/>
+                      <a:tailEnd type="none" w="med" len="med"/>
+                    </a:lnL>
+                    <a:lnR w="6350" cap="flat" cmpd="sng" algn="ctr">
+                      <a:solidFill>
+                        <a:srgbClr val="000000"/>
+                      </a:solidFill>
+                      <a:prstDash val="solid"/>
+                      <a:round/>
+                      <a:headEnd type="none" w="med" len="med"/>
+                      <a:tailEnd type="none" w="med" len="med"/>
+                    </a:lnR>
+                    <a:lnT w="6350" cap="flat" cmpd="sng" algn="ctr">
+                      <a:solidFill>
+                        <a:srgbClr val="000000"/>
+                      </a:solidFill>
+                      <a:prstDash val="solid"/>
+                      <a:round/>
+                      <a:headEnd type="none" w="med" len="med"/>
+                      <a:tailEnd type="none" w="med" len="med"/>
+                    </a:lnT>
+                    <a:lnB w="6350" cap="flat" cmpd="sng" algn="ctr">
+                      <a:solidFill>
+                        <a:srgbClr val="000000"/>
+                      </a:solidFill>
+                      <a:prstDash val="solid"/>
+                      <a:round/>
+                      <a:headEnd type="none" w="med" len="med"/>
+                      <a:tailEnd type="none" w="med" len="med"/>
+                    </a:lnB>
+                  </a:tcPr>
+                </a:tc>
+                <a:extLst>
+                  <a:ext uri="{0D108BD9-81ED-4DB2-BD59-A6C34878D82A}">
+                    <a16:rowId xmlns:a16="http://schemas.microsoft.com/office/drawing/2014/main" val="1235455310"/>
+                  </a:ext>
+                </a:extLst>
+              </a:tr>
+              <a:tr h="508000">
+                <a:tc>
+                  <a:txBody>
+                    <a:bodyPr/>
+                    <a:lstStyle/>
+                    <a:p>
+                      <a:pPr algn="ctr" fontAlgn="ctr"/>
+                      <a:r>
+                        <a:rPr lang="en-US" sz="1400" b="0" i="0" u="none" strike="noStrike">
+                          <a:solidFill>
+                            <a:srgbClr val="000000"/>
+                          </a:solidFill>
+                          <a:effectLst/>
+                          <a:latin typeface="Source Sans Pro Regular" panose="020B0503030403020204" pitchFamily="34" charset="0"/>
+                        </a:rPr>
+                        <a:t>Location n</a:t>
+                      </a:r>
+                    </a:p>
+                  </a:txBody>
+                  <a:tcPr marL="9525" marR="9525" marT="9525" marB="0" anchor="ctr">
+                    <a:lnL w="6350" cap="flat" cmpd="sng" algn="ctr">
+                      <a:solidFill>
+                        <a:srgbClr val="000000"/>
+                      </a:solidFill>
+                      <a:prstDash val="solid"/>
+                      <a:round/>
+                      <a:headEnd type="none" w="med" len="med"/>
+                      <a:tailEnd type="none" w="med" len="med"/>
+                    </a:lnL>
+                    <a:lnR w="6350" cap="flat" cmpd="sng" algn="ctr">
+                      <a:solidFill>
+                        <a:srgbClr val="000000"/>
+                      </a:solidFill>
+                      <a:prstDash val="solid"/>
+                      <a:round/>
+                      <a:headEnd type="none" w="med" len="med"/>
+                      <a:tailEnd type="none" w="med" len="med"/>
+                    </a:lnR>
+                    <a:lnT w="6350" cap="flat" cmpd="sng" algn="ctr">
+                      <a:solidFill>
+                        <a:srgbClr val="000000"/>
+                      </a:solidFill>
+                      <a:prstDash val="solid"/>
+                      <a:round/>
+                      <a:headEnd type="none" w="med" len="med"/>
+                      <a:tailEnd type="none" w="med" len="med"/>
+                    </a:lnT>
+                    <a:lnB w="6350" cap="flat" cmpd="sng" algn="ctr">
+                      <a:solidFill>
+                        <a:srgbClr val="000000"/>
+                      </a:solidFill>
+                      <a:prstDash val="solid"/>
+                      <a:round/>
+                      <a:headEnd type="none" w="med" len="med"/>
+                      <a:tailEnd type="none" w="med" len="med"/>
+                    </a:lnB>
+                  </a:tcPr>
+                </a:tc>
+                <a:tc>
+                  <a:txBody>
+                    <a:bodyPr/>
+                    <a:lstStyle/>
+                    <a:p>
+                      <a:pPr algn="ctr" fontAlgn="ctr"/>
+                      <a:r>
+                        <a:rPr lang="en-US" sz="2000" b="0" i="0" u="none" strike="noStrike">
+                          <a:solidFill>
+                            <a:srgbClr val="000000"/>
+                          </a:solidFill>
+                          <a:effectLst/>
+                          <a:latin typeface="Source Sans Pro Regular" panose="020B0503030403020204" pitchFamily="34" charset="0"/>
+                        </a:rPr>
+                        <a:t>4</a:t>
+                      </a:r>
+                    </a:p>
+                  </a:txBody>
+                  <a:tcPr marL="9525" marR="9525" marT="9525" marB="0" anchor="ctr">
+                    <a:lnL w="6350" cap="flat" cmpd="sng" algn="ctr">
+                      <a:solidFill>
+                        <a:srgbClr val="000000"/>
+                      </a:solidFill>
+                      <a:prstDash val="solid"/>
+                      <a:round/>
+                      <a:headEnd type="none" w="med" len="med"/>
+                      <a:tailEnd type="none" w="med" len="med"/>
+                    </a:lnL>
+                    <a:lnR w="6350" cap="flat" cmpd="sng" algn="ctr">
+                      <a:solidFill>
+                        <a:srgbClr val="000000"/>
+                      </a:solidFill>
+                      <a:prstDash val="solid"/>
+                      <a:round/>
+                      <a:headEnd type="none" w="med" len="med"/>
+                      <a:tailEnd type="none" w="med" len="med"/>
+                    </a:lnR>
+                    <a:lnT w="6350" cap="flat" cmpd="sng" algn="ctr">
+                      <a:solidFill>
+                        <a:srgbClr val="000000"/>
+                      </a:solidFill>
+                      <a:prstDash val="solid"/>
+                      <a:round/>
+                      <a:headEnd type="none" w="med" len="med"/>
+                      <a:tailEnd type="none" w="med" len="med"/>
+                    </a:lnT>
+                    <a:lnB w="6350" cap="flat" cmpd="sng" algn="ctr">
+                      <a:solidFill>
+                        <a:srgbClr val="000000"/>
+                      </a:solidFill>
+                      <a:prstDash val="solid"/>
+                      <a:round/>
+                      <a:headEnd type="none" w="med" len="med"/>
+                      <a:tailEnd type="none" w="med" len="med"/>
+                    </a:lnB>
+                  </a:tcPr>
+                </a:tc>
+                <a:tc>
+                  <a:txBody>
+                    <a:bodyPr/>
+                    <a:lstStyle/>
+                    <a:p>
+                      <a:pPr algn="ctr" fontAlgn="ctr"/>
+                      <a:r>
+                        <a:rPr lang="en-US" sz="2000" b="0" i="0" u="none" strike="noStrike">
+                          <a:solidFill>
+                            <a:srgbClr val="000000"/>
+                          </a:solidFill>
+                          <a:effectLst/>
+                          <a:latin typeface="Source Sans Pro Regular" panose="020B0503030403020204" pitchFamily="34" charset="0"/>
+                        </a:rPr>
+                        <a:t>5</a:t>
+                      </a:r>
+                    </a:p>
+                  </a:txBody>
+                  <a:tcPr marL="9525" marR="9525" marT="9525" marB="0" anchor="ctr">
+                    <a:lnL w="6350" cap="flat" cmpd="sng" algn="ctr">
+                      <a:solidFill>
+                        <a:srgbClr val="000000"/>
+                      </a:solidFill>
+                      <a:prstDash val="solid"/>
+                      <a:round/>
+                      <a:headEnd type="none" w="med" len="med"/>
+                      <a:tailEnd type="none" w="med" len="med"/>
+                    </a:lnL>
+                    <a:lnR w="6350" cap="flat" cmpd="sng" algn="ctr">
+                      <a:solidFill>
+                        <a:srgbClr val="000000"/>
+                      </a:solidFill>
+                      <a:prstDash val="solid"/>
+                      <a:round/>
+                      <a:headEnd type="none" w="med" len="med"/>
+                      <a:tailEnd type="none" w="med" len="med"/>
+                    </a:lnR>
+                    <a:lnT w="6350" cap="flat" cmpd="sng" algn="ctr">
+                      <a:solidFill>
+                        <a:srgbClr val="000000"/>
+                      </a:solidFill>
+                      <a:prstDash val="solid"/>
+                      <a:round/>
+                      <a:headEnd type="none" w="med" len="med"/>
+                      <a:tailEnd type="none" w="med" len="med"/>
+                    </a:lnT>
+                    <a:lnB w="6350" cap="flat" cmpd="sng" algn="ctr">
+                      <a:solidFill>
+                        <a:srgbClr val="000000"/>
+                      </a:solidFill>
+                      <a:prstDash val="solid"/>
+                      <a:round/>
+                      <a:headEnd type="none" w="med" len="med"/>
+                      <a:tailEnd type="none" w="med" len="med"/>
+                    </a:lnB>
+                  </a:tcPr>
+                </a:tc>
+                <a:tc>
+                  <a:txBody>
+                    <a:bodyPr/>
+                    <a:lstStyle/>
+                    <a:p>
+                      <a:pPr algn="ctr" fontAlgn="ctr"/>
+                      <a:r>
+                        <a:rPr lang="en-US" sz="1400" b="1" i="0" u="none" strike="noStrike">
+                          <a:solidFill>
+                            <a:srgbClr val="000000"/>
+                          </a:solidFill>
+                          <a:effectLst/>
+                          <a:latin typeface="Source Sans Pro Regular" panose="020B0503030403020204" pitchFamily="34" charset="0"/>
+                        </a:rPr>
+                        <a:t>…</a:t>
+                      </a:r>
+                    </a:p>
+                  </a:txBody>
+                  <a:tcPr marL="9525" marR="9525" marT="9525" marB="0" anchor="ctr">
+                    <a:lnL w="6350" cap="flat" cmpd="sng" algn="ctr">
+                      <a:solidFill>
+                        <a:srgbClr val="000000"/>
+                      </a:solidFill>
+                      <a:prstDash val="solid"/>
+                      <a:round/>
+                      <a:headEnd type="none" w="med" len="med"/>
+                      <a:tailEnd type="none" w="med" len="med"/>
+                    </a:lnL>
+                    <a:lnR w="6350" cap="flat" cmpd="sng" algn="ctr">
+                      <a:solidFill>
+                        <a:srgbClr val="000000"/>
+                      </a:solidFill>
+                      <a:prstDash val="solid"/>
+                      <a:round/>
+                      <a:headEnd type="none" w="med" len="med"/>
+                      <a:tailEnd type="none" w="med" len="med"/>
+                    </a:lnR>
+                    <a:lnT w="6350" cap="flat" cmpd="sng" algn="ctr">
+                      <a:solidFill>
+                        <a:srgbClr val="000000"/>
+                      </a:solidFill>
+                      <a:prstDash val="solid"/>
+                      <a:round/>
+                      <a:headEnd type="none" w="med" len="med"/>
+                      <a:tailEnd type="none" w="med" len="med"/>
+                    </a:lnT>
+                    <a:lnB w="6350" cap="flat" cmpd="sng" algn="ctr">
+                      <a:solidFill>
+                        <a:srgbClr val="000000"/>
+                      </a:solidFill>
+                      <a:prstDash val="solid"/>
+                      <a:round/>
+                      <a:headEnd type="none" w="med" len="med"/>
+                      <a:tailEnd type="none" w="med" len="med"/>
+                    </a:lnB>
+                  </a:tcPr>
+                </a:tc>
+                <a:tc>
+                  <a:txBody>
+                    <a:bodyPr/>
+                    <a:lstStyle/>
+                    <a:p>
+                      <a:pPr algn="ctr" fontAlgn="ctr"/>
+                      <a:r>
+                        <a:rPr lang="en-US" sz="2000" b="0" i="0" u="none" strike="noStrike" dirty="0">
+                          <a:solidFill>
+                            <a:srgbClr val="000000"/>
+                          </a:solidFill>
+                          <a:effectLst/>
+                          <a:latin typeface="Source Sans Pro Regular" panose="020B0503030403020204" pitchFamily="34" charset="0"/>
+                        </a:rPr>
+                        <a:t>0</a:t>
+                      </a:r>
+                    </a:p>
+                  </a:txBody>
+                  <a:tcPr marL="9525" marR="9525" marT="9525" marB="0" anchor="ctr">
+                    <a:lnL w="6350" cap="flat" cmpd="sng" algn="ctr">
+                      <a:solidFill>
+                        <a:srgbClr val="000000"/>
+                      </a:solidFill>
+                      <a:prstDash val="solid"/>
+                      <a:round/>
+                      <a:headEnd type="none" w="med" len="med"/>
+                      <a:tailEnd type="none" w="med" len="med"/>
+                    </a:lnL>
+                    <a:lnR w="6350" cap="flat" cmpd="sng" algn="ctr">
+                      <a:solidFill>
+                        <a:srgbClr val="000000"/>
+                      </a:solidFill>
+                      <a:prstDash val="solid"/>
+                      <a:round/>
+                      <a:headEnd type="none" w="med" len="med"/>
+                      <a:tailEnd type="none" w="med" len="med"/>
+                    </a:lnR>
+                    <a:lnT w="6350" cap="flat" cmpd="sng" algn="ctr">
+                      <a:solidFill>
+                        <a:srgbClr val="000000"/>
+                      </a:solidFill>
+                      <a:prstDash val="solid"/>
+                      <a:round/>
+                      <a:headEnd type="none" w="med" len="med"/>
+                      <a:tailEnd type="none" w="med" len="med"/>
+                    </a:lnT>
+                    <a:lnB w="6350" cap="flat" cmpd="sng" algn="ctr">
+                      <a:solidFill>
+                        <a:srgbClr val="000000"/>
+                      </a:solidFill>
+                      <a:prstDash val="solid"/>
+                      <a:round/>
+                      <a:headEnd type="none" w="med" len="med"/>
+                      <a:tailEnd type="none" w="med" len="med"/>
+                    </a:lnB>
+                  </a:tcPr>
+                </a:tc>
+                <a:extLst>
+                  <a:ext uri="{0D108BD9-81ED-4DB2-BD59-A6C34878D82A}">
+                    <a16:rowId xmlns:a16="http://schemas.microsoft.com/office/drawing/2014/main" val="1721923218"/>
+                  </a:ext>
+                </a:extLst>
+              </a:tr>
+            </a:tbl>
+          </a:graphicData>
+        </a:graphic>
+      </p:graphicFrame>
+    </p:spTree>
+    <p:extLst>
+      <p:ext uri="{BB962C8B-B14F-4D97-AF65-F5344CB8AC3E}">
+        <p14:creationId xmlns:p14="http://schemas.microsoft.com/office/powerpoint/2010/main" val="1021542733"/>
+      </p:ext>
+    </p:extLst>
+  </p:cSld>
+  <p:clrMapOvr>
+    <a:masterClrMapping/>
+  </p:clrMapOvr>
+</p:sld>
+</file>
+
 <file path=ppt/theme/theme1.xml><?xml version="1.0" encoding="utf-8"?>
 <a:theme xmlns:a="http://schemas.openxmlformats.org/drawingml/2006/main" name="Office Theme">
   <a:themeElements>

</xml_diff>